<commit_message>
pushing project - no models
</commit_message>
<xml_diff>
--- a/Presentation/Pump it up Presentation.pptx
+++ b/Presentation/Pump it up Presentation.pptx
@@ -5,7 +5,7 @@
     <p:sldMasterId id="2147483659" r:id="rId1"/>
   </p:sldMasterIdLst>
   <p:notesMasterIdLst>
-    <p:notesMasterId r:id="rId15"/>
+    <p:notesMasterId r:id="rId14"/>
   </p:notesMasterIdLst>
   <p:sldIdLst>
     <p:sldId id="256" r:id="rId2"/>
@@ -15,22 +15,21 @@
     <p:sldId id="271" r:id="rId6"/>
     <p:sldId id="269" r:id="rId7"/>
     <p:sldId id="270" r:id="rId8"/>
-    <p:sldId id="261" r:id="rId9"/>
-    <p:sldId id="260" r:id="rId10"/>
+    <p:sldId id="260" r:id="rId9"/>
+    <p:sldId id="261" r:id="rId10"/>
     <p:sldId id="262" r:id="rId11"/>
-    <p:sldId id="263" r:id="rId12"/>
-    <p:sldId id="264" r:id="rId13"/>
-    <p:sldId id="266" r:id="rId14"/>
+    <p:sldId id="264" r:id="rId12"/>
+    <p:sldId id="266" r:id="rId13"/>
   </p:sldIdLst>
   <p:sldSz cx="9144000" cy="5143500" type="screen16x9"/>
   <p:notesSz cx="6858000" cy="9144000"/>
   <p:embeddedFontLst>
     <p:embeddedFont>
       <p:font typeface="Proxima Nova" panose="020B0604020202020204" charset="0"/>
-      <p:regular r:id="rId16"/>
-      <p:bold r:id="rId17"/>
-      <p:italic r:id="rId18"/>
-      <p:boldItalic r:id="rId19"/>
+      <p:regular r:id="rId15"/>
+      <p:bold r:id="rId16"/>
+      <p:italic r:id="rId17"/>
+      <p:boldItalic r:id="rId18"/>
     </p:embeddedFont>
   </p:embeddedFontLst>
   <p:defaultTextStyle>
@@ -935,7 +934,7 @@
   <p:cSld>
     <p:spTree>
       <p:nvGrpSpPr>
-        <p:cNvPr id="1" name="Shape 111"/>
+        <p:cNvPr id="1" name="Shape 118"/>
         <p:cNvGrpSpPr/>
         <p:nvPr/>
       </p:nvGrpSpPr>
@@ -949,7 +948,7 @@
       </p:grpSpPr>
       <p:sp>
         <p:nvSpPr>
-          <p:cNvPr id="112" name="Google Shape;112;gc5200c42bf_0_36:notes"/>
+          <p:cNvPr id="119" name="Google Shape;119;gc5200c42bf_0_43:notes"/>
           <p:cNvSpPr>
             <a:spLocks noGrp="1" noRot="1" noChangeAspect="1"/>
           </p:cNvSpPr>
@@ -990,7 +989,7 @@
       </p:sp>
       <p:sp>
         <p:nvSpPr>
-          <p:cNvPr id="113" name="Google Shape;113;gc5200c42bf_0_36:notes"/>
+          <p:cNvPr id="120" name="Google Shape;120;gc5200c42bf_0_43:notes"/>
           <p:cNvSpPr txBox="1">
             <a:spLocks noGrp="1"/>
           </p:cNvSpPr>
@@ -1035,110 +1034,6 @@
 </file>
 
 <file path=ppt/notesSlides/notesSlide12.xml><?xml version="1.0" encoding="utf-8"?>
-<p:notes xmlns:a="http://schemas.openxmlformats.org/drawingml/2006/main" xmlns:r="http://schemas.openxmlformats.org/officeDocument/2006/relationships" xmlns:p="http://schemas.openxmlformats.org/presentationml/2006/main" showMasterSp="0" showMasterPhAnim="0">
-  <p:cSld>
-    <p:spTree>
-      <p:nvGrpSpPr>
-        <p:cNvPr id="1" name="Shape 118"/>
-        <p:cNvGrpSpPr/>
-        <p:nvPr/>
-      </p:nvGrpSpPr>
-      <p:grpSpPr>
-        <a:xfrm>
-          <a:off x="0" y="0"/>
-          <a:ext cx="0" cy="0"/>
-          <a:chOff x="0" y="0"/>
-          <a:chExt cx="0" cy="0"/>
-        </a:xfrm>
-      </p:grpSpPr>
-      <p:sp>
-        <p:nvSpPr>
-          <p:cNvPr id="119" name="Google Shape;119;gc5200c42bf_0_43:notes"/>
-          <p:cNvSpPr>
-            <a:spLocks noGrp="1" noRot="1" noChangeAspect="1"/>
-          </p:cNvSpPr>
-          <p:nvPr>
-            <p:ph type="sldImg" idx="2"/>
-          </p:nvPr>
-        </p:nvSpPr>
-        <p:spPr>
-          <a:xfrm>
-            <a:off x="381000" y="685800"/>
-            <a:ext cx="6096000" cy="3429000"/>
-          </a:xfrm>
-          <a:custGeom>
-            <a:avLst/>
-            <a:gdLst/>
-            <a:ahLst/>
-            <a:cxnLst/>
-            <a:rect l="l" t="t" r="r" b="b"/>
-            <a:pathLst>
-              <a:path w="120000" h="120000" extrusionOk="0">
-                <a:moveTo>
-                  <a:pt x="0" y="0"/>
-                </a:moveTo>
-                <a:lnTo>
-                  <a:pt x="120000" y="0"/>
-                </a:lnTo>
-                <a:lnTo>
-                  <a:pt x="120000" y="120000"/>
-                </a:lnTo>
-                <a:lnTo>
-                  <a:pt x="0" y="120000"/>
-                </a:lnTo>
-                <a:close/>
-              </a:path>
-            </a:pathLst>
-          </a:custGeom>
-        </p:spPr>
-      </p:sp>
-      <p:sp>
-        <p:nvSpPr>
-          <p:cNvPr id="120" name="Google Shape;120;gc5200c42bf_0_43:notes"/>
-          <p:cNvSpPr txBox="1">
-            <a:spLocks noGrp="1"/>
-          </p:cNvSpPr>
-          <p:nvPr>
-            <p:ph type="body" idx="1"/>
-          </p:nvPr>
-        </p:nvSpPr>
-        <p:spPr>
-          <a:xfrm>
-            <a:off x="685800" y="4343400"/>
-            <a:ext cx="5486400" cy="4114800"/>
-          </a:xfrm>
-          <a:prstGeom prst="rect">
-            <a:avLst/>
-          </a:prstGeom>
-        </p:spPr>
-        <p:txBody>
-          <a:bodyPr spcFirstLastPara="1" wrap="square" lIns="91425" tIns="91425" rIns="91425" bIns="91425" anchor="t" anchorCtr="0">
-            <a:noAutofit/>
-          </a:bodyPr>
-          <a:lstStyle/>
-          <a:p>
-            <a:pPr marL="0" lvl="0" indent="0" algn="l" rtl="0">
-              <a:spcBef>
-                <a:spcPts val="0"/>
-              </a:spcBef>
-              <a:spcAft>
-                <a:spcPts val="0"/>
-              </a:spcAft>
-              <a:buNone/>
-            </a:pPr>
-            <a:endParaRPr/>
-          </a:p>
-        </p:txBody>
-      </p:sp>
-    </p:spTree>
-  </p:cSld>
-  <p:clrMapOvr>
-    <a:masterClrMapping/>
-  </p:clrMapOvr>
-</p:notes>
-</file>
-
-<file path=ppt/notesSlides/notesSlide13.xml><?xml version="1.0" encoding="utf-8"?>
 <p:notes xmlns:a="http://schemas.openxmlformats.org/drawingml/2006/main" xmlns:r="http://schemas.openxmlformats.org/officeDocument/2006/relationships" xmlns:p="http://schemas.openxmlformats.org/presentationml/2006/main" showMasterSp="0" showMasterPhAnim="0">
   <p:cSld>
     <p:spTree>
@@ -1886,6 +1781,110 @@
   <p:cSld>
     <p:spTree>
       <p:nvGrpSpPr>
+        <p:cNvPr id="1" name="Shape 91"/>
+        <p:cNvGrpSpPr/>
+        <p:nvPr/>
+      </p:nvGrpSpPr>
+      <p:grpSpPr>
+        <a:xfrm>
+          <a:off x="0" y="0"/>
+          <a:ext cx="0" cy="0"/>
+          <a:chOff x="0" y="0"/>
+          <a:chExt cx="0" cy="0"/>
+        </a:xfrm>
+      </p:grpSpPr>
+      <p:sp>
+        <p:nvSpPr>
+          <p:cNvPr id="92" name="Google Shape;92;g8a55b5f358_0_71:notes"/>
+          <p:cNvSpPr>
+            <a:spLocks noGrp="1" noRot="1" noChangeAspect="1"/>
+          </p:cNvSpPr>
+          <p:nvPr>
+            <p:ph type="sldImg" idx="2"/>
+          </p:nvPr>
+        </p:nvSpPr>
+        <p:spPr>
+          <a:xfrm>
+            <a:off x="381000" y="685800"/>
+            <a:ext cx="6096000" cy="3429000"/>
+          </a:xfrm>
+          <a:custGeom>
+            <a:avLst/>
+            <a:gdLst/>
+            <a:ahLst/>
+            <a:cxnLst/>
+            <a:rect l="l" t="t" r="r" b="b"/>
+            <a:pathLst>
+              <a:path w="120000" h="120000" extrusionOk="0">
+                <a:moveTo>
+                  <a:pt x="0" y="0"/>
+                </a:moveTo>
+                <a:lnTo>
+                  <a:pt x="120000" y="0"/>
+                </a:lnTo>
+                <a:lnTo>
+                  <a:pt x="120000" y="120000"/>
+                </a:lnTo>
+                <a:lnTo>
+                  <a:pt x="0" y="120000"/>
+                </a:lnTo>
+                <a:close/>
+              </a:path>
+            </a:pathLst>
+          </a:custGeom>
+        </p:spPr>
+      </p:sp>
+      <p:sp>
+        <p:nvSpPr>
+          <p:cNvPr id="93" name="Google Shape;93;g8a55b5f358_0_71:notes"/>
+          <p:cNvSpPr txBox="1">
+            <a:spLocks noGrp="1"/>
+          </p:cNvSpPr>
+          <p:nvPr>
+            <p:ph type="body" idx="1"/>
+          </p:nvPr>
+        </p:nvSpPr>
+        <p:spPr>
+          <a:xfrm>
+            <a:off x="685800" y="4343400"/>
+            <a:ext cx="5486400" cy="4114800"/>
+          </a:xfrm>
+          <a:prstGeom prst="rect">
+            <a:avLst/>
+          </a:prstGeom>
+        </p:spPr>
+        <p:txBody>
+          <a:bodyPr spcFirstLastPara="1" wrap="square" lIns="91425" tIns="91425" rIns="91425" bIns="91425" anchor="t" anchorCtr="0">
+            <a:noAutofit/>
+          </a:bodyPr>
+          <a:lstStyle/>
+          <a:p>
+            <a:pPr marL="0" lvl="0" indent="0" algn="l" rtl="0">
+              <a:spcBef>
+                <a:spcPts val="0"/>
+              </a:spcBef>
+              <a:spcAft>
+                <a:spcPts val="0"/>
+              </a:spcAft>
+              <a:buNone/>
+            </a:pPr>
+            <a:endParaRPr/>
+          </a:p>
+        </p:txBody>
+      </p:sp>
+    </p:spTree>
+  </p:cSld>
+  <p:clrMapOvr>
+    <a:masterClrMapping/>
+  </p:clrMapOvr>
+</p:notes>
+</file>
+
+<file path=ppt/notesSlides/notesSlide9.xml><?xml version="1.0" encoding="utf-8"?>
+<p:notes xmlns:a="http://schemas.openxmlformats.org/drawingml/2006/main" xmlns:r="http://schemas.openxmlformats.org/officeDocument/2006/relationships" xmlns:p="http://schemas.openxmlformats.org/presentationml/2006/main" showMasterSp="0" showMasterPhAnim="0">
+  <p:cSld>
+    <p:spTree>
+      <p:nvGrpSpPr>
         <p:cNvPr id="1" name="Shape 98"/>
         <p:cNvGrpSpPr/>
         <p:nvPr/>
@@ -1942,110 +1941,6 @@
       <p:sp>
         <p:nvSpPr>
           <p:cNvPr id="100" name="Google Shape;100;gc5200c42bf_0_25:notes"/>
-          <p:cNvSpPr txBox="1">
-            <a:spLocks noGrp="1"/>
-          </p:cNvSpPr>
-          <p:nvPr>
-            <p:ph type="body" idx="1"/>
-          </p:nvPr>
-        </p:nvSpPr>
-        <p:spPr>
-          <a:xfrm>
-            <a:off x="685800" y="4343400"/>
-            <a:ext cx="5486400" cy="4114800"/>
-          </a:xfrm>
-          <a:prstGeom prst="rect">
-            <a:avLst/>
-          </a:prstGeom>
-        </p:spPr>
-        <p:txBody>
-          <a:bodyPr spcFirstLastPara="1" wrap="square" lIns="91425" tIns="91425" rIns="91425" bIns="91425" anchor="t" anchorCtr="0">
-            <a:noAutofit/>
-          </a:bodyPr>
-          <a:lstStyle/>
-          <a:p>
-            <a:pPr marL="0" lvl="0" indent="0" algn="l" rtl="0">
-              <a:spcBef>
-                <a:spcPts val="0"/>
-              </a:spcBef>
-              <a:spcAft>
-                <a:spcPts val="0"/>
-              </a:spcAft>
-              <a:buNone/>
-            </a:pPr>
-            <a:endParaRPr/>
-          </a:p>
-        </p:txBody>
-      </p:sp>
-    </p:spTree>
-  </p:cSld>
-  <p:clrMapOvr>
-    <a:masterClrMapping/>
-  </p:clrMapOvr>
-</p:notes>
-</file>
-
-<file path=ppt/notesSlides/notesSlide9.xml><?xml version="1.0" encoding="utf-8"?>
-<p:notes xmlns:a="http://schemas.openxmlformats.org/drawingml/2006/main" xmlns:r="http://schemas.openxmlformats.org/officeDocument/2006/relationships" xmlns:p="http://schemas.openxmlformats.org/presentationml/2006/main" showMasterSp="0" showMasterPhAnim="0">
-  <p:cSld>
-    <p:spTree>
-      <p:nvGrpSpPr>
-        <p:cNvPr id="1" name="Shape 91"/>
-        <p:cNvGrpSpPr/>
-        <p:nvPr/>
-      </p:nvGrpSpPr>
-      <p:grpSpPr>
-        <a:xfrm>
-          <a:off x="0" y="0"/>
-          <a:ext cx="0" cy="0"/>
-          <a:chOff x="0" y="0"/>
-          <a:chExt cx="0" cy="0"/>
-        </a:xfrm>
-      </p:grpSpPr>
-      <p:sp>
-        <p:nvSpPr>
-          <p:cNvPr id="92" name="Google Shape;92;g8a55b5f358_0_71:notes"/>
-          <p:cNvSpPr>
-            <a:spLocks noGrp="1" noRot="1" noChangeAspect="1"/>
-          </p:cNvSpPr>
-          <p:nvPr>
-            <p:ph type="sldImg" idx="2"/>
-          </p:nvPr>
-        </p:nvSpPr>
-        <p:spPr>
-          <a:xfrm>
-            <a:off x="381000" y="685800"/>
-            <a:ext cx="6096000" cy="3429000"/>
-          </a:xfrm>
-          <a:custGeom>
-            <a:avLst/>
-            <a:gdLst/>
-            <a:ahLst/>
-            <a:cxnLst/>
-            <a:rect l="l" t="t" r="r" b="b"/>
-            <a:pathLst>
-              <a:path w="120000" h="120000" extrusionOk="0">
-                <a:moveTo>
-                  <a:pt x="0" y="0"/>
-                </a:moveTo>
-                <a:lnTo>
-                  <a:pt x="120000" y="0"/>
-                </a:lnTo>
-                <a:lnTo>
-                  <a:pt x="120000" y="120000"/>
-                </a:lnTo>
-                <a:lnTo>
-                  <a:pt x="0" y="120000"/>
-                </a:lnTo>
-                <a:close/>
-              </a:path>
-            </a:pathLst>
-          </a:custGeom>
-        </p:spPr>
-      </p:sp>
-      <p:sp>
-        <p:nvSpPr>
-          <p:cNvPr id="93" name="Google Shape;93;g8a55b5f358_0_71:notes"/>
           <p:cNvSpPr txBox="1">
             <a:spLocks noGrp="1"/>
           </p:cNvSpPr>
@@ -7719,7 +7614,7 @@
               <a:rPr lang="en" dirty="0">
                 <a:latin typeface="+mn-lt"/>
               </a:rPr>
-              <a:t>Conclusion – What does it all mean?</a:t>
+              <a:t>Recommendations</a:t>
             </a:r>
             <a:endParaRPr dirty="0">
               <a:latin typeface="+mn-lt"/>
@@ -7765,7 +7660,58 @@
               <a:rPr lang="en" dirty="0">
                 <a:latin typeface="+mn-lt"/>
               </a:rPr>
-              <a:t>Whilst the model explained 83.5% of the variance in sale price, it performed worse in more expensive properties.</a:t>
+              <a:t>The model still mis-classifies some pumps so for this reason:</a:t>
+            </a:r>
+          </a:p>
+          <a:p>
+            <a:pPr marL="285750" indent="-285750">
+              <a:spcAft>
+                <a:spcPts val="1600"/>
+              </a:spcAft>
+            </a:pPr>
+            <a:r>
+              <a:rPr lang="en" dirty="0">
+                <a:latin typeface="+mn-lt"/>
+              </a:rPr>
+              <a:t>Recommended to survey some ‘functional’ pumps in all site visits to capture errors</a:t>
+            </a:r>
+          </a:p>
+          <a:p>
+            <a:pPr marL="285750" indent="-285750">
+              <a:spcAft>
+                <a:spcPts val="1600"/>
+              </a:spcAft>
+            </a:pPr>
+            <a:r>
+              <a:rPr lang="en-GB" dirty="0">
+                <a:latin typeface="+mn-lt"/>
+              </a:rPr>
+              <a:t>Population data was poor, it may be worth trying to extract this information from another source</a:t>
+            </a:r>
+          </a:p>
+          <a:p>
+            <a:pPr marL="285750" indent="-285750">
+              <a:spcAft>
+                <a:spcPts val="1600"/>
+              </a:spcAft>
+            </a:pPr>
+            <a:r>
+              <a:rPr lang="en-GB" dirty="0">
+                <a:latin typeface="+mn-lt"/>
+              </a:rPr>
+              <a:t>Prioritise maintenance schedule to target areas with fewest working pumps per capita </a:t>
+            </a:r>
+            <a:r>
+              <a:rPr lang="en-GB" dirty="0" err="1">
+                <a:latin typeface="+mn-lt"/>
+              </a:rPr>
+              <a:t>i.e</a:t>
+            </a:r>
+            <a:r>
+              <a:rPr lang="en-GB" dirty="0">
+                <a:latin typeface="+mn-lt"/>
+              </a:rPr>
+              <a:t> need reliable population data.</a:t>
             </a:r>
             <a:endParaRPr dirty="0">
               <a:latin typeface="+mn-lt"/>
@@ -7782,151 +7728,6 @@
 </file>
 
 <file path=ppt/slides/slide11.xml><?xml version="1.0" encoding="utf-8"?>
-<p:sld xmlns:a="http://schemas.openxmlformats.org/drawingml/2006/main" xmlns:r="http://schemas.openxmlformats.org/officeDocument/2006/relationships" xmlns:p="http://schemas.openxmlformats.org/presentationml/2006/main">
-  <p:cSld>
-    <p:spTree>
-      <p:nvGrpSpPr>
-        <p:cNvPr id="1" name="Shape 114"/>
-        <p:cNvGrpSpPr/>
-        <p:nvPr/>
-      </p:nvGrpSpPr>
-      <p:grpSpPr>
-        <a:xfrm>
-          <a:off x="0" y="0"/>
-          <a:ext cx="0" cy="0"/>
-          <a:chOff x="0" y="0"/>
-          <a:chExt cx="0" cy="0"/>
-        </a:xfrm>
-      </p:grpSpPr>
-      <p:sp>
-        <p:nvSpPr>
-          <p:cNvPr id="115" name="Google Shape;115;p20"/>
-          <p:cNvSpPr txBox="1">
-            <a:spLocks noGrp="1"/>
-          </p:cNvSpPr>
-          <p:nvPr>
-            <p:ph type="title"/>
-          </p:nvPr>
-        </p:nvSpPr>
-        <p:spPr>
-          <a:xfrm>
-            <a:off x="292750" y="0"/>
-            <a:ext cx="8520600" cy="572700"/>
-          </a:xfrm>
-          <a:prstGeom prst="rect">
-            <a:avLst/>
-          </a:prstGeom>
-        </p:spPr>
-        <p:txBody>
-          <a:bodyPr spcFirstLastPara="1" wrap="square" lIns="91425" tIns="91425" rIns="91425" bIns="91425" anchor="t" anchorCtr="0">
-            <a:noAutofit/>
-          </a:bodyPr>
-          <a:lstStyle/>
-          <a:p>
-            <a:pPr marL="0" lvl="0" indent="0" algn="l" rtl="0">
-              <a:spcBef>
-                <a:spcPts val="0"/>
-              </a:spcBef>
-              <a:spcAft>
-                <a:spcPts val="0"/>
-              </a:spcAft>
-              <a:buNone/>
-            </a:pPr>
-            <a:r>
-              <a:rPr lang="en">
-                <a:latin typeface="+mj-lt"/>
-              </a:rPr>
-              <a:t>Conclusion - Further Work</a:t>
-            </a:r>
-            <a:endParaRPr>
-              <a:latin typeface="+mj-lt"/>
-            </a:endParaRPr>
-          </a:p>
-        </p:txBody>
-      </p:sp>
-      <p:sp>
-        <p:nvSpPr>
-          <p:cNvPr id="116" name="Google Shape;116;p20"/>
-          <p:cNvSpPr txBox="1">
-            <a:spLocks noGrp="1"/>
-          </p:cNvSpPr>
-          <p:nvPr>
-            <p:ph type="body" idx="1"/>
-          </p:nvPr>
-        </p:nvSpPr>
-        <p:spPr>
-          <a:xfrm>
-            <a:off x="354275" y="546800"/>
-            <a:ext cx="8520600" cy="3416400"/>
-          </a:xfrm>
-          <a:prstGeom prst="rect">
-            <a:avLst/>
-          </a:prstGeom>
-        </p:spPr>
-        <p:txBody>
-          <a:bodyPr spcFirstLastPara="1" wrap="square" lIns="91425" tIns="91425" rIns="91425" bIns="91425" anchor="t" anchorCtr="0">
-            <a:noAutofit/>
-          </a:bodyPr>
-          <a:lstStyle/>
-          <a:p>
-            <a:pPr marL="0" lvl="0" indent="0" algn="l" rtl="0">
-              <a:spcBef>
-                <a:spcPts val="0"/>
-              </a:spcBef>
-              <a:spcAft>
-                <a:spcPts val="1600"/>
-              </a:spcAft>
-              <a:buNone/>
-            </a:pPr>
-            <a:r>
-              <a:rPr lang="en" dirty="0">
-                <a:latin typeface="+mj-lt"/>
-              </a:rPr>
-              <a:t>By mapping top 200 locations where difference between model and actual was the largest, it can be seen that the model underestimates price very close to water.</a:t>
-            </a:r>
-            <a:endParaRPr dirty="0">
-              <a:latin typeface="+mj-lt"/>
-            </a:endParaRPr>
-          </a:p>
-        </p:txBody>
-      </p:sp>
-      <p:pic>
-        <p:nvPicPr>
-          <p:cNvPr id="117" name="Google Shape;117;p20"/>
-          <p:cNvPicPr preferRelativeResize="0"/>
-          <p:nvPr/>
-        </p:nvPicPr>
-        <p:blipFill>
-          <a:blip r:embed="rId3">
-            <a:alphaModFix/>
-          </a:blip>
-          <a:stretch>
-            <a:fillRect/>
-          </a:stretch>
-        </p:blipFill>
-        <p:spPr>
-          <a:xfrm>
-            <a:off x="1362800" y="1315750"/>
-            <a:ext cx="6111599" cy="3681049"/>
-          </a:xfrm>
-          <a:prstGeom prst="rect">
-            <a:avLst/>
-          </a:prstGeom>
-          <a:noFill/>
-          <a:ln>
-            <a:noFill/>
-          </a:ln>
-        </p:spPr>
-      </p:pic>
-    </p:spTree>
-  </p:cSld>
-  <p:clrMapOvr>
-    <a:masterClrMapping/>
-  </p:clrMapOvr>
-</p:sld>
-</file>
-
-<file path=ppt/slides/slide12.xml><?xml version="1.0" encoding="utf-8"?>
 <p:sld xmlns:a="http://schemas.openxmlformats.org/drawingml/2006/main" xmlns:r="http://schemas.openxmlformats.org/officeDocument/2006/relationships" xmlns:p="http://schemas.openxmlformats.org/presentationml/2006/main">
   <p:cSld>
     <p:spTree>
@@ -7955,7 +7756,7 @@
         </p:nvSpPr>
         <p:spPr>
           <a:xfrm>
-            <a:off x="311700" y="445025"/>
+            <a:off x="311700" y="86807"/>
             <a:ext cx="8520600" cy="572700"/>
           </a:xfrm>
           <a:prstGeom prst="rect">
@@ -8070,7 +7871,7 @@
               <a:rPr lang="en" dirty="0">
                 <a:latin typeface="+mj-lt"/>
               </a:rPr>
-              <a:t>Source external data, rainfall data, maintenance records</a:t>
+              <a:t>Source external data, rainfall data, maintenance records for new features</a:t>
             </a:r>
           </a:p>
           <a:p>
@@ -8088,7 +7889,7 @@
               <a:rPr lang="en" dirty="0">
                 <a:latin typeface="+mj-lt"/>
               </a:rPr>
-              <a:t>Are dry pumps really not functional?</a:t>
+              <a:t>Are dry pumps really not functional? This may not improve the model but understanding this could help maintenance prioritisation. </a:t>
             </a:r>
             <a:endParaRPr dirty="0">
               <a:latin typeface="+mj-lt"/>
@@ -8104,7 +7905,7 @@
 </p:sld>
 </file>
 
-<file path=ppt/slides/slide13.xml><?xml version="1.0" encoding="utf-8"?>
+<file path=ppt/slides/slide12.xml><?xml version="1.0" encoding="utf-8"?>
 <p:sld xmlns:a="http://schemas.openxmlformats.org/drawingml/2006/main" xmlns:r="http://schemas.openxmlformats.org/officeDocument/2006/relationships" xmlns:p="http://schemas.openxmlformats.org/presentationml/2006/main">
   <p:cSld>
     <p:spTree>
@@ -8680,67 +8481,6 @@
           </a:p>
         </p:txBody>
       </p:sp>
-      <p:sp>
-        <p:nvSpPr>
-          <p:cNvPr id="78" name="Google Shape;78;p15"/>
-          <p:cNvSpPr txBox="1"/>
-          <p:nvPr/>
-        </p:nvSpPr>
-        <p:spPr>
-          <a:xfrm>
-            <a:off x="4086350" y="4764950"/>
-            <a:ext cx="2725500" cy="276900"/>
-          </a:xfrm>
-          <a:prstGeom prst="rect">
-            <a:avLst/>
-          </a:prstGeom>
-          <a:noFill/>
-          <a:ln>
-            <a:noFill/>
-          </a:ln>
-        </p:spPr>
-        <p:txBody>
-          <a:bodyPr spcFirstLastPara="1" wrap="square" lIns="91425" tIns="91425" rIns="91425" bIns="91425" anchor="t" anchorCtr="0">
-            <a:spAutoFit/>
-          </a:bodyPr>
-          <a:lstStyle/>
-          <a:p>
-            <a:pPr marL="0" lvl="0" indent="0" algn="l" rtl="0">
-              <a:spcBef>
-                <a:spcPts val="0"/>
-              </a:spcBef>
-              <a:spcAft>
-                <a:spcPts val="0"/>
-              </a:spcAft>
-              <a:buNone/>
-            </a:pPr>
-            <a:r>
-              <a:rPr lang="en" sz="600" b="1">
-                <a:latin typeface="Proxima Nova"/>
-                <a:ea typeface="Proxima Nova"/>
-                <a:cs typeface="Proxima Nova"/>
-                <a:sym typeface="Proxima Nova"/>
-              </a:rPr>
-              <a:t>CRISP-DM Process Model </a:t>
-            </a:r>
-            <a:r>
-              <a:rPr lang="en" sz="600" b="1" baseline="30000">
-                <a:latin typeface="Proxima Nova"/>
-                <a:ea typeface="Proxima Nova"/>
-                <a:cs typeface="Proxima Nova"/>
-                <a:sym typeface="Proxima Nova"/>
-              </a:rPr>
-              <a:t>3</a:t>
-            </a:r>
-            <a:endParaRPr sz="600" b="1" baseline="30000">
-              <a:latin typeface="Proxima Nova"/>
-              <a:ea typeface="Proxima Nova"/>
-              <a:cs typeface="Proxima Nova"/>
-              <a:sym typeface="Proxima Nova"/>
-            </a:endParaRPr>
-          </a:p>
-        </p:txBody>
-      </p:sp>
       <p:pic>
         <p:nvPicPr>
           <p:cNvPr id="3" name="Picture 2">
@@ -8763,7 +8503,7 @@
         </p:blipFill>
         <p:spPr>
           <a:xfrm>
-            <a:off x="199454" y="970281"/>
+            <a:off x="206689" y="852899"/>
             <a:ext cx="1953553" cy="3912051"/>
           </a:xfrm>
           <a:prstGeom prst="rect">
@@ -10205,6 +9945,180 @@
   <p:cSld>
     <p:spTree>
       <p:nvGrpSpPr>
+        <p:cNvPr id="1" name="Shape 94"/>
+        <p:cNvGrpSpPr/>
+        <p:nvPr/>
+      </p:nvGrpSpPr>
+      <p:grpSpPr>
+        <a:xfrm>
+          <a:off x="0" y="0"/>
+          <a:ext cx="0" cy="0"/>
+          <a:chOff x="0" y="0"/>
+          <a:chExt cx="0" cy="0"/>
+        </a:xfrm>
+      </p:grpSpPr>
+      <p:sp>
+        <p:nvSpPr>
+          <p:cNvPr id="95" name="Google Shape;95;p17"/>
+          <p:cNvSpPr txBox="1">
+            <a:spLocks noGrp="1"/>
+          </p:cNvSpPr>
+          <p:nvPr>
+            <p:ph type="title"/>
+          </p:nvPr>
+        </p:nvSpPr>
+        <p:spPr>
+          <a:xfrm>
+            <a:off x="335350" y="-94375"/>
+            <a:ext cx="8520600" cy="572700"/>
+          </a:xfrm>
+          <a:prstGeom prst="rect">
+            <a:avLst/>
+          </a:prstGeom>
+        </p:spPr>
+        <p:txBody>
+          <a:bodyPr spcFirstLastPara="1" wrap="square" lIns="91425" tIns="91425" rIns="91425" bIns="91425" anchor="t" anchorCtr="0">
+            <a:noAutofit/>
+          </a:bodyPr>
+          <a:lstStyle/>
+          <a:p>
+            <a:pPr marL="0" lvl="0" indent="0" algn="l" rtl="0">
+              <a:spcBef>
+                <a:spcPts val="0"/>
+              </a:spcBef>
+              <a:spcAft>
+                <a:spcPts val="0"/>
+              </a:spcAft>
+              <a:buNone/>
+            </a:pPr>
+            <a:r>
+              <a:rPr lang="en" dirty="0">
+                <a:latin typeface="+mj-lt"/>
+              </a:rPr>
+              <a:t>Feature Importance</a:t>
+            </a:r>
+            <a:endParaRPr dirty="0">
+              <a:latin typeface="+mj-lt"/>
+            </a:endParaRPr>
+          </a:p>
+        </p:txBody>
+      </p:sp>
+      <p:sp>
+        <p:nvSpPr>
+          <p:cNvPr id="96" name="Google Shape;96;p17"/>
+          <p:cNvSpPr txBox="1">
+            <a:spLocks noGrp="1"/>
+          </p:cNvSpPr>
+          <p:nvPr>
+            <p:ph type="body" idx="1"/>
+          </p:nvPr>
+        </p:nvSpPr>
+        <p:spPr>
+          <a:xfrm>
+            <a:off x="363725" y="355275"/>
+            <a:ext cx="8520600" cy="3416400"/>
+          </a:xfrm>
+          <a:prstGeom prst="rect">
+            <a:avLst/>
+          </a:prstGeom>
+        </p:spPr>
+        <p:txBody>
+          <a:bodyPr spcFirstLastPara="1" wrap="square" lIns="91425" tIns="91425" rIns="91425" bIns="91425" anchor="t" anchorCtr="0">
+            <a:noAutofit/>
+          </a:bodyPr>
+          <a:lstStyle/>
+          <a:p>
+            <a:pPr marL="0" lvl="0" indent="0" algn="l" rtl="0">
+              <a:spcBef>
+                <a:spcPts val="1600"/>
+              </a:spcBef>
+              <a:spcAft>
+                <a:spcPts val="1600"/>
+              </a:spcAft>
+              <a:buNone/>
+            </a:pPr>
+            <a:r>
+              <a:rPr lang="en-GB" sz="1500" dirty="0">
+                <a:latin typeface="+mj-lt"/>
+              </a:rPr>
+              <a:t>On the two best performing models, an important feature was quantity, and in particular when one hot encoded X9_dry. Random Forest appears to have more intuitive importances: age, location, population.</a:t>
+            </a:r>
+          </a:p>
+        </p:txBody>
+      </p:sp>
+      <p:pic>
+        <p:nvPicPr>
+          <p:cNvPr id="3" name="Picture 2">
+            <a:extLst>
+              <a:ext uri="{FF2B5EF4-FFF2-40B4-BE49-F238E27FC236}">
+                <a16:creationId xmlns:a16="http://schemas.microsoft.com/office/drawing/2014/main" id="{7F254DF5-72E1-4255-A8E1-DB531FB6179B}"/>
+              </a:ext>
+            </a:extLst>
+          </p:cNvPr>
+          <p:cNvPicPr>
+            <a:picLocks noChangeAspect="1"/>
+          </p:cNvPicPr>
+          <p:nvPr/>
+        </p:nvPicPr>
+        <p:blipFill>
+          <a:blip r:embed="rId3"/>
+          <a:stretch>
+            <a:fillRect/>
+          </a:stretch>
+        </p:blipFill>
+        <p:spPr>
+          <a:xfrm>
+            <a:off x="252950" y="1696825"/>
+            <a:ext cx="4135227" cy="2744153"/>
+          </a:xfrm>
+          <a:prstGeom prst="rect">
+            <a:avLst/>
+          </a:prstGeom>
+        </p:spPr>
+      </p:pic>
+      <p:pic>
+        <p:nvPicPr>
+          <p:cNvPr id="5" name="Picture 4">
+            <a:extLst>
+              <a:ext uri="{FF2B5EF4-FFF2-40B4-BE49-F238E27FC236}">
+                <a16:creationId xmlns:a16="http://schemas.microsoft.com/office/drawing/2014/main" id="{DBA987F1-756A-44A4-AEA6-0BF08CEBF1A8}"/>
+              </a:ext>
+            </a:extLst>
+          </p:cNvPr>
+          <p:cNvPicPr>
+            <a:picLocks noChangeAspect="1"/>
+          </p:cNvPicPr>
+          <p:nvPr/>
+        </p:nvPicPr>
+        <p:blipFill>
+          <a:blip r:embed="rId4"/>
+          <a:stretch>
+            <a:fillRect/>
+          </a:stretch>
+        </p:blipFill>
+        <p:spPr>
+          <a:xfrm>
+            <a:off x="4474597" y="1696825"/>
+            <a:ext cx="4219865" cy="2744153"/>
+          </a:xfrm>
+          <a:prstGeom prst="rect">
+            <a:avLst/>
+          </a:prstGeom>
+        </p:spPr>
+      </p:pic>
+    </p:spTree>
+  </p:cSld>
+  <p:clrMapOvr>
+    <a:masterClrMapping/>
+  </p:clrMapOvr>
+</p:sld>
+</file>
+
+<file path=ppt/slides/slide9.xml><?xml version="1.0" encoding="utf-8"?>
+<p:sld xmlns:a="http://schemas.openxmlformats.org/drawingml/2006/main" xmlns:r="http://schemas.openxmlformats.org/officeDocument/2006/relationships" xmlns:p="http://schemas.openxmlformats.org/presentationml/2006/main">
+  <p:cSld>
+    <p:spTree>
+      <p:nvGrpSpPr>
         <p:cNvPr id="1" name="Shape 101"/>
         <p:cNvGrpSpPr/>
         <p:nvPr/>
@@ -10255,7 +10169,7 @@
               <a:rPr lang="en" dirty="0">
                 <a:latin typeface="+mj-lt"/>
               </a:rPr>
-              <a:t>Results - What will add Value?</a:t>
+              <a:t>Results -</a:t>
             </a:r>
             <a:endParaRPr dirty="0">
               <a:latin typeface="+mj-lt"/>
@@ -10299,10 +10213,10 @@
               <a:buChar char="●"/>
             </a:pPr>
             <a:r>
-              <a:rPr lang="en" sz="1700" dirty="0">
+              <a:rPr lang="en-GB" sz="1700" dirty="0">
                 <a:latin typeface="+mj-lt"/>
               </a:rPr>
-              <a:t>Square Footage Total Living  increase by 1: Sale Price increase by 119 USD</a:t>
+              <a:t>XGBoost Tuned Model has best overall accuracy</a:t>
             </a:r>
             <a:endParaRPr sz="1700" dirty="0">
               <a:latin typeface="+mj-lt"/>
@@ -10323,11 +10237,8 @@
               <a:rPr lang="en" sz="1700" dirty="0">
                 <a:latin typeface="+mj-lt"/>
               </a:rPr>
-              <a:t>Adding bathroom could add 30,000 USD</a:t>
+              <a:t>Accuracy 0.7748</a:t>
             </a:r>
-            <a:endParaRPr sz="1700" dirty="0">
-              <a:latin typeface="+mj-lt"/>
-            </a:endParaRPr>
           </a:p>
           <a:p>
             <a:pPr marL="457200" lvl="0" indent="-336550" algn="l" rtl="0">
@@ -10344,9 +10255,21 @@
               <a:rPr lang="en" sz="1700" dirty="0">
                 <a:latin typeface="+mj-lt"/>
               </a:rPr>
-              <a:t>Carrying out renovation adds 58,220 USD</a:t>
+              <a:t>Recall 0.7875</a:t>
             </a:r>
-            <a:endParaRPr sz="1700" dirty="0">
+          </a:p>
+          <a:p>
+            <a:pPr marL="457200" lvl="0" indent="-336550" algn="l" rtl="0">
+              <a:spcBef>
+                <a:spcPts val="0"/>
+              </a:spcBef>
+              <a:spcAft>
+                <a:spcPts val="0"/>
+              </a:spcAft>
+              <a:buSzPts val="1700"/>
+              <a:buChar char="●"/>
+            </a:pPr>
+            <a:endParaRPr lang="en" sz="1700" dirty="0">
               <a:latin typeface="+mj-lt"/>
             </a:endParaRPr>
           </a:p>
@@ -10365,11 +10288,8 @@
               <a:rPr lang="en" sz="1700" dirty="0">
                 <a:latin typeface="+mj-lt"/>
               </a:rPr>
-              <a:t>Adding porch could add 17,560USD</a:t>
+              <a:t>Random Forest also performed well, with perhaps less overfitting and more interpretable / understandable importances.</a:t>
             </a:r>
-            <a:endParaRPr sz="1700" dirty="0">
-              <a:latin typeface="+mj-lt"/>
-            </a:endParaRPr>
           </a:p>
           <a:p>
             <a:pPr marL="457200" lvl="0" indent="-336550" algn="l" rtl="0">
@@ -10386,11 +10306,8 @@
               <a:rPr lang="en" sz="1700" dirty="0">
                 <a:latin typeface="+mj-lt"/>
               </a:rPr>
-              <a:t>Improving condition of house from Average to Good increases price by 33,950 USD </a:t>
+              <a:t>Accuracy 0.7583</a:t>
             </a:r>
-            <a:endParaRPr sz="1700" dirty="0">
-              <a:latin typeface="+mj-lt"/>
-            </a:endParaRPr>
           </a:p>
           <a:p>
             <a:pPr marL="457200" lvl="0" indent="-336550" algn="l" rtl="0">
@@ -10407,7 +10324,7 @@
               <a:rPr lang="en" sz="1700" dirty="0">
                 <a:latin typeface="+mj-lt"/>
               </a:rPr>
-              <a:t>Fix the issues: A home sold with a problem such as water issue will sell for 18,960 USD less than one without</a:t>
+              <a:t>Recall 0.7561</a:t>
             </a:r>
             <a:endParaRPr sz="1700" dirty="0">
               <a:latin typeface="+mj-lt"/>
@@ -10443,180 +10360,6 @@
           </a:p>
         </p:txBody>
       </p:sp>
-    </p:spTree>
-  </p:cSld>
-  <p:clrMapOvr>
-    <a:masterClrMapping/>
-  </p:clrMapOvr>
-</p:sld>
-</file>
-
-<file path=ppt/slides/slide9.xml><?xml version="1.0" encoding="utf-8"?>
-<p:sld xmlns:a="http://schemas.openxmlformats.org/drawingml/2006/main" xmlns:r="http://schemas.openxmlformats.org/officeDocument/2006/relationships" xmlns:p="http://schemas.openxmlformats.org/presentationml/2006/main">
-  <p:cSld>
-    <p:spTree>
-      <p:nvGrpSpPr>
-        <p:cNvPr id="1" name="Shape 94"/>
-        <p:cNvGrpSpPr/>
-        <p:nvPr/>
-      </p:nvGrpSpPr>
-      <p:grpSpPr>
-        <a:xfrm>
-          <a:off x="0" y="0"/>
-          <a:ext cx="0" cy="0"/>
-          <a:chOff x="0" y="0"/>
-          <a:chExt cx="0" cy="0"/>
-        </a:xfrm>
-      </p:grpSpPr>
-      <p:sp>
-        <p:nvSpPr>
-          <p:cNvPr id="95" name="Google Shape;95;p17"/>
-          <p:cNvSpPr txBox="1">
-            <a:spLocks noGrp="1"/>
-          </p:cNvSpPr>
-          <p:nvPr>
-            <p:ph type="title"/>
-          </p:nvPr>
-        </p:nvSpPr>
-        <p:spPr>
-          <a:xfrm>
-            <a:off x="335350" y="-94375"/>
-            <a:ext cx="8520600" cy="572700"/>
-          </a:xfrm>
-          <a:prstGeom prst="rect">
-            <a:avLst/>
-          </a:prstGeom>
-        </p:spPr>
-        <p:txBody>
-          <a:bodyPr spcFirstLastPara="1" wrap="square" lIns="91425" tIns="91425" rIns="91425" bIns="91425" anchor="t" anchorCtr="0">
-            <a:noAutofit/>
-          </a:bodyPr>
-          <a:lstStyle/>
-          <a:p>
-            <a:pPr marL="0" lvl="0" indent="0" algn="l" rtl="0">
-              <a:spcBef>
-                <a:spcPts val="0"/>
-              </a:spcBef>
-              <a:spcAft>
-                <a:spcPts val="0"/>
-              </a:spcAft>
-              <a:buNone/>
-            </a:pPr>
-            <a:r>
-              <a:rPr lang="en" dirty="0">
-                <a:latin typeface="+mj-lt"/>
-              </a:rPr>
-              <a:t>Feature Importance</a:t>
-            </a:r>
-            <a:endParaRPr dirty="0">
-              <a:latin typeface="+mj-lt"/>
-            </a:endParaRPr>
-          </a:p>
-        </p:txBody>
-      </p:sp>
-      <p:sp>
-        <p:nvSpPr>
-          <p:cNvPr id="96" name="Google Shape;96;p17"/>
-          <p:cNvSpPr txBox="1">
-            <a:spLocks noGrp="1"/>
-          </p:cNvSpPr>
-          <p:nvPr>
-            <p:ph type="body" idx="1"/>
-          </p:nvPr>
-        </p:nvSpPr>
-        <p:spPr>
-          <a:xfrm>
-            <a:off x="363725" y="355275"/>
-            <a:ext cx="8520600" cy="3416400"/>
-          </a:xfrm>
-          <a:prstGeom prst="rect">
-            <a:avLst/>
-          </a:prstGeom>
-        </p:spPr>
-        <p:txBody>
-          <a:bodyPr spcFirstLastPara="1" wrap="square" lIns="91425" tIns="91425" rIns="91425" bIns="91425" anchor="t" anchorCtr="0">
-            <a:noAutofit/>
-          </a:bodyPr>
-          <a:lstStyle/>
-          <a:p>
-            <a:pPr marL="0" lvl="0" indent="0" algn="l" rtl="0">
-              <a:spcBef>
-                <a:spcPts val="1600"/>
-              </a:spcBef>
-              <a:spcAft>
-                <a:spcPts val="1600"/>
-              </a:spcAft>
-              <a:buNone/>
-            </a:pPr>
-            <a:r>
-              <a:rPr lang="en-GB" sz="1500" dirty="0">
-                <a:latin typeface="+mj-lt"/>
-              </a:rPr>
-              <a:t>On the two best performing models, an important feature was quantity, and in particular when one hot encoded X9_dry. Random Forest appears to have more intuitive importances: age, location, population.</a:t>
-            </a:r>
-          </a:p>
-        </p:txBody>
-      </p:sp>
-      <p:pic>
-        <p:nvPicPr>
-          <p:cNvPr id="3" name="Picture 2">
-            <a:extLst>
-              <a:ext uri="{FF2B5EF4-FFF2-40B4-BE49-F238E27FC236}">
-                <a16:creationId xmlns:a16="http://schemas.microsoft.com/office/drawing/2014/main" id="{7F254DF5-72E1-4255-A8E1-DB531FB6179B}"/>
-              </a:ext>
-            </a:extLst>
-          </p:cNvPr>
-          <p:cNvPicPr>
-            <a:picLocks noChangeAspect="1"/>
-          </p:cNvPicPr>
-          <p:nvPr/>
-        </p:nvPicPr>
-        <p:blipFill>
-          <a:blip r:embed="rId3"/>
-          <a:stretch>
-            <a:fillRect/>
-          </a:stretch>
-        </p:blipFill>
-        <p:spPr>
-          <a:xfrm>
-            <a:off x="252950" y="1696825"/>
-            <a:ext cx="4135227" cy="2744153"/>
-          </a:xfrm>
-          <a:prstGeom prst="rect">
-            <a:avLst/>
-          </a:prstGeom>
-        </p:spPr>
-      </p:pic>
-      <p:pic>
-        <p:nvPicPr>
-          <p:cNvPr id="5" name="Picture 4">
-            <a:extLst>
-              <a:ext uri="{FF2B5EF4-FFF2-40B4-BE49-F238E27FC236}">
-                <a16:creationId xmlns:a16="http://schemas.microsoft.com/office/drawing/2014/main" id="{DBA987F1-756A-44A4-AEA6-0BF08CEBF1A8}"/>
-              </a:ext>
-            </a:extLst>
-          </p:cNvPr>
-          <p:cNvPicPr>
-            <a:picLocks noChangeAspect="1"/>
-          </p:cNvPicPr>
-          <p:nvPr/>
-        </p:nvPicPr>
-        <p:blipFill>
-          <a:blip r:embed="rId4"/>
-          <a:stretch>
-            <a:fillRect/>
-          </a:stretch>
-        </p:blipFill>
-        <p:spPr>
-          <a:xfrm>
-            <a:off x="4474597" y="1696825"/>
-            <a:ext cx="4219865" cy="2744153"/>
-          </a:xfrm>
-          <a:prstGeom prst="rect">
-            <a:avLst/>
-          </a:prstGeom>
-        </p:spPr>
-      </p:pic>
     </p:spTree>
   </p:cSld>
   <p:clrMapOvr>

</xml_diff>